<commit_message>
Deleted unneeded files and updated slides
</commit_message>
<xml_diff>
--- a/challenge#6/Challenge6_Group4.pptx
+++ b/challenge#6/Challenge6_Group4.pptx
@@ -7325,20 +7325,12 @@
               <a:t>Xbee's</a:t>
             </a:r>
             <a:r>
-              <a:rPr lang="en-US" sz="1800">
+              <a:rPr lang="en-US" sz="1800" dirty="0">
                 <a:solidFill>
                   <a:srgbClr val="174576"/>
                 </a:solidFill>
               </a:rPr>
-              <a:t> API/AT mode</a:t>
-            </a:r>
-            <a:r>
-              <a:rPr lang="en-US" sz="1800">
-                <a:solidFill>
-                  <a:srgbClr val="174576"/>
-                </a:solidFill>
-              </a:rPr>
-              <a:t>) </a:t>
+              <a:t> API/AT mode) </a:t>
             </a:r>
             <a:endParaRPr lang="en-US" altLang="zh-CN" sz="1800" dirty="0" smtClean="0"/>
           </a:p>

</xml_diff>